<commit_message>
Updated project 1 powerpoint
</commit_message>
<xml_diff>
--- a/hw01/Data Mining Project 1.pptx
+++ b/hw01/Data Mining Project 1.pptx
@@ -16,6 +16,7 @@
     <p:sldId id="264" r:id="rId10"/>
     <p:sldId id="265" r:id="rId11"/>
     <p:sldId id="266" r:id="rId12"/>
+    <p:sldId id="268" r:id="rId13"/>
   </p:sldIdLst>
   <p:sldSz cx="12192000" cy="6858000"/>
   <p:notesSz cx="6858000" cy="9144000"/>
@@ -374,11 +375,11 @@
           <c:showBubbleSize val="0"/>
         </c:dLbls>
         <c:smooth val="0"/>
-        <c:axId val="488055504"/>
-        <c:axId val="494079208"/>
+        <c:axId val="343166552"/>
+        <c:axId val="342874888"/>
       </c:lineChart>
       <c:catAx>
-        <c:axId val="488055504"/>
+        <c:axId val="343166552"/>
         <c:scaling>
           <c:orientation val="minMax"/>
         </c:scaling>
@@ -421,7 +422,7 @@
             <a:endParaRPr lang="en-US"/>
           </a:p>
         </c:txPr>
-        <c:crossAx val="494079208"/>
+        <c:crossAx val="342874888"/>
         <c:crosses val="autoZero"/>
         <c:auto val="1"/>
         <c:lblAlgn val="ctr"/>
@@ -429,7 +430,7 @@
         <c:noMultiLvlLbl val="0"/>
       </c:catAx>
       <c:valAx>
-        <c:axId val="494079208"/>
+        <c:axId val="342874888"/>
         <c:scaling>
           <c:orientation val="minMax"/>
         </c:scaling>
@@ -480,7 +481,7 @@
             <a:endParaRPr lang="en-US"/>
           </a:p>
         </c:txPr>
-        <c:crossAx val="488055504"/>
+        <c:crossAx val="343166552"/>
         <c:crosses val="autoZero"/>
         <c:crossBetween val="between"/>
       </c:valAx>
@@ -554,8 +555,13 @@
             </a:pPr>
             <a:r>
               <a:rPr lang="en-US"/>
-              <a:t>ATNT 50 KNN Correct Classification</a:t>
-            </a:r>
+              <a:t>ATNT200</a:t>
+            </a:r>
+            <a:r>
+              <a:rPr lang="en-US" baseline="0"/>
+              <a:t> KNN Correct Classification</a:t>
+            </a:r>
+            <a:endParaRPr lang="en-US"/>
           </a:p>
         </c:rich>
       </c:tx>
@@ -591,7 +597,17 @@
     </c:title>
     <c:autoTitleDeleted val="0"/>
     <c:plotArea>
-      <c:layout/>
+      <c:layout>
+        <c:manualLayout>
+          <c:layoutTarget val="inner"/>
+          <c:xMode val="edge"/>
+          <c:yMode val="edge"/>
+          <c:x val="3.4731391960706043E-2"/>
+          <c:y val="9.3639576331042779E-2"/>
+          <c:w val="0.94780218761466173"/>
+          <c:h val="0.84803242371939302"/>
+        </c:manualLayout>
+      </c:layout>
       <c:lineChart>
         <c:grouping val="standard"/>
         <c:varyColors val="0"/>
@@ -599,7 +615,7 @@
           <c:idx val="0"/>
           <c:order val="0"/>
           <c:spPr>
-            <a:ln w="47625" cap="rnd">
+            <a:ln w="28575" cap="rnd">
               <a:solidFill>
                 <a:schemeClr val="bg1"/>
               </a:solidFill>
@@ -612,10 +628,10 @@
           </c:marker>
           <c:cat>
             <c:numRef>
-              <c:f>Sheet1!$A$1:$A$22</c:f>
+              <c:f>Sheet1!$A$1:$A$89</c:f>
               <c:numCache>
                 <c:formatCode>General</c:formatCode>
-                <c:ptCount val="22"/>
+                <c:ptCount val="89"/>
                 <c:pt idx="0">
                   <c:v>3</c:v>
                 </c:pt>
@@ -681,81 +697,483 @@
                 </c:pt>
                 <c:pt idx="21">
                   <c:v>45</c:v>
+                </c:pt>
+                <c:pt idx="22">
+                  <c:v>47</c:v>
+                </c:pt>
+                <c:pt idx="23">
+                  <c:v>49</c:v>
+                </c:pt>
+                <c:pt idx="24">
+                  <c:v>51</c:v>
+                </c:pt>
+                <c:pt idx="25">
+                  <c:v>53</c:v>
+                </c:pt>
+                <c:pt idx="26">
+                  <c:v>55</c:v>
+                </c:pt>
+                <c:pt idx="27">
+                  <c:v>57</c:v>
+                </c:pt>
+                <c:pt idx="28">
+                  <c:v>59</c:v>
+                </c:pt>
+                <c:pt idx="29">
+                  <c:v>61</c:v>
+                </c:pt>
+                <c:pt idx="30">
+                  <c:v>63</c:v>
+                </c:pt>
+                <c:pt idx="31">
+                  <c:v>65</c:v>
+                </c:pt>
+                <c:pt idx="32">
+                  <c:v>67</c:v>
+                </c:pt>
+                <c:pt idx="33">
+                  <c:v>69</c:v>
+                </c:pt>
+                <c:pt idx="34">
+                  <c:v>71</c:v>
+                </c:pt>
+                <c:pt idx="35">
+                  <c:v>73</c:v>
+                </c:pt>
+                <c:pt idx="36">
+                  <c:v>75</c:v>
+                </c:pt>
+                <c:pt idx="37">
+                  <c:v>77</c:v>
+                </c:pt>
+                <c:pt idx="38">
+                  <c:v>79</c:v>
+                </c:pt>
+                <c:pt idx="39">
+                  <c:v>81</c:v>
+                </c:pt>
+                <c:pt idx="40">
+                  <c:v>83</c:v>
+                </c:pt>
+                <c:pt idx="41">
+                  <c:v>85</c:v>
+                </c:pt>
+                <c:pt idx="42">
+                  <c:v>87</c:v>
+                </c:pt>
+                <c:pt idx="43">
+                  <c:v>89</c:v>
+                </c:pt>
+                <c:pt idx="44">
+                  <c:v>91</c:v>
+                </c:pt>
+                <c:pt idx="45">
+                  <c:v>93</c:v>
+                </c:pt>
+                <c:pt idx="46">
+                  <c:v>95</c:v>
+                </c:pt>
+                <c:pt idx="47">
+                  <c:v>97</c:v>
+                </c:pt>
+                <c:pt idx="48">
+                  <c:v>99</c:v>
+                </c:pt>
+                <c:pt idx="49">
+                  <c:v>101</c:v>
+                </c:pt>
+                <c:pt idx="50">
+                  <c:v>103</c:v>
+                </c:pt>
+                <c:pt idx="51">
+                  <c:v>105</c:v>
+                </c:pt>
+                <c:pt idx="52">
+                  <c:v>107</c:v>
+                </c:pt>
+                <c:pt idx="53">
+                  <c:v>109</c:v>
+                </c:pt>
+                <c:pt idx="54">
+                  <c:v>111</c:v>
+                </c:pt>
+                <c:pt idx="55">
+                  <c:v>113</c:v>
+                </c:pt>
+                <c:pt idx="56">
+                  <c:v>115</c:v>
+                </c:pt>
+                <c:pt idx="57">
+                  <c:v>117</c:v>
+                </c:pt>
+                <c:pt idx="58">
+                  <c:v>119</c:v>
+                </c:pt>
+                <c:pt idx="59">
+                  <c:v>121</c:v>
+                </c:pt>
+                <c:pt idx="60">
+                  <c:v>123</c:v>
+                </c:pt>
+                <c:pt idx="61">
+                  <c:v>125</c:v>
+                </c:pt>
+                <c:pt idx="62">
+                  <c:v>127</c:v>
+                </c:pt>
+                <c:pt idx="63">
+                  <c:v>129</c:v>
+                </c:pt>
+                <c:pt idx="64">
+                  <c:v>131</c:v>
+                </c:pt>
+                <c:pt idx="65">
+                  <c:v>133</c:v>
+                </c:pt>
+                <c:pt idx="66">
+                  <c:v>135</c:v>
+                </c:pt>
+                <c:pt idx="67">
+                  <c:v>137</c:v>
+                </c:pt>
+                <c:pt idx="68">
+                  <c:v>139</c:v>
+                </c:pt>
+                <c:pt idx="69">
+                  <c:v>141</c:v>
+                </c:pt>
+                <c:pt idx="70">
+                  <c:v>143</c:v>
+                </c:pt>
+                <c:pt idx="71">
+                  <c:v>145</c:v>
+                </c:pt>
+                <c:pt idx="72">
+                  <c:v>147</c:v>
+                </c:pt>
+                <c:pt idx="73">
+                  <c:v>149</c:v>
+                </c:pt>
+                <c:pt idx="74">
+                  <c:v>151</c:v>
+                </c:pt>
+                <c:pt idx="75">
+                  <c:v>153</c:v>
+                </c:pt>
+                <c:pt idx="76">
+                  <c:v>155</c:v>
+                </c:pt>
+                <c:pt idx="77">
+                  <c:v>157</c:v>
+                </c:pt>
+                <c:pt idx="78">
+                  <c:v>159</c:v>
+                </c:pt>
+                <c:pt idx="79">
+                  <c:v>161</c:v>
+                </c:pt>
+                <c:pt idx="80">
+                  <c:v>163</c:v>
+                </c:pt>
+                <c:pt idx="81">
+                  <c:v>165</c:v>
+                </c:pt>
+                <c:pt idx="82">
+                  <c:v>167</c:v>
+                </c:pt>
+                <c:pt idx="83">
+                  <c:v>169</c:v>
+                </c:pt>
+                <c:pt idx="84">
+                  <c:v>171</c:v>
+                </c:pt>
+                <c:pt idx="85">
+                  <c:v>173</c:v>
+                </c:pt>
+                <c:pt idx="86">
+                  <c:v>175</c:v>
+                </c:pt>
+                <c:pt idx="87">
+                  <c:v>177</c:v>
+                </c:pt>
+                <c:pt idx="88">
+                  <c:v>179</c:v>
                 </c:pt>
               </c:numCache>
             </c:numRef>
           </c:cat>
           <c:val>
             <c:numRef>
-              <c:f>Sheet1!$B$1:$B$22</c:f>
+              <c:f>Sheet1!$B$1:$B$89</c:f>
               <c:numCache>
                 <c:formatCode>General</c:formatCode>
-                <c:ptCount val="22"/>
+                <c:ptCount val="89"/>
                 <c:pt idx="0">
-                  <c:v>1</c:v>
+                  <c:v>0.95</c:v>
                 </c:pt>
                 <c:pt idx="1">
-                  <c:v>1</c:v>
+                  <c:v>0.95</c:v>
                 </c:pt>
                 <c:pt idx="2">
-                  <c:v>1</c:v>
+                  <c:v>0.9</c:v>
                 </c:pt>
                 <c:pt idx="3">
-                  <c:v>1</c:v>
+                  <c:v>0.9</c:v>
                 </c:pt>
                 <c:pt idx="4">
-                  <c:v>0.8</c:v>
+                  <c:v>0.85</c:v>
                 </c:pt>
                 <c:pt idx="5">
                   <c:v>0.8</c:v>
                 </c:pt>
                 <c:pt idx="6">
-                  <c:v>1</c:v>
+                  <c:v>0.8</c:v>
                 </c:pt>
                 <c:pt idx="7">
-                  <c:v>0.6</c:v>
+                  <c:v>0.8</c:v>
                 </c:pt>
                 <c:pt idx="8">
-                  <c:v>0.6</c:v>
+                  <c:v>0.8</c:v>
                 </c:pt>
                 <c:pt idx="9">
-                  <c:v>0.6</c:v>
+                  <c:v>0.8</c:v>
                 </c:pt>
                 <c:pt idx="10">
                   <c:v>0.8</c:v>
                 </c:pt>
                 <c:pt idx="11">
+                  <c:v>0.8</c:v>
+                </c:pt>
+                <c:pt idx="12">
+                  <c:v>0.8</c:v>
+                </c:pt>
+                <c:pt idx="13">
+                  <c:v>0.75</c:v>
+                </c:pt>
+                <c:pt idx="14">
+                  <c:v>0.75</c:v>
+                </c:pt>
+                <c:pt idx="15">
+                  <c:v>0.8</c:v>
+                </c:pt>
+                <c:pt idx="16">
+                  <c:v>0.8</c:v>
+                </c:pt>
+                <c:pt idx="17">
+                  <c:v>0.8</c:v>
+                </c:pt>
+                <c:pt idx="18">
+                  <c:v>0.7</c:v>
+                </c:pt>
+                <c:pt idx="19">
                   <c:v>0.6</c:v>
                 </c:pt>
-                <c:pt idx="12">
-                  <c:v>0.4</c:v>
-                </c:pt>
-                <c:pt idx="13">
-                  <c:v>0.4</c:v>
-                </c:pt>
-                <c:pt idx="14">
-                  <c:v>0.4</c:v>
-                </c:pt>
-                <c:pt idx="15">
-                  <c:v>0.4</c:v>
-                </c:pt>
-                <c:pt idx="16">
-                  <c:v>0.4</c:v>
-                </c:pt>
-                <c:pt idx="17">
+                <c:pt idx="20">
+                  <c:v>0.55000000000000004</c:v>
+                </c:pt>
+                <c:pt idx="21">
+                  <c:v>0.55000000000000004</c:v>
+                </c:pt>
+                <c:pt idx="22">
+                  <c:v>0.55000000000000004</c:v>
+                </c:pt>
+                <c:pt idx="23">
+                  <c:v>0.5</c:v>
+                </c:pt>
+                <c:pt idx="24">
+                  <c:v>0.55000000000000004</c:v>
+                </c:pt>
+                <c:pt idx="25">
+                  <c:v>0.55000000000000004</c:v>
+                </c:pt>
+                <c:pt idx="26">
+                  <c:v>0.55000000000000004</c:v>
+                </c:pt>
+                <c:pt idx="27">
+                  <c:v>0.5</c:v>
+                </c:pt>
+                <c:pt idx="28">
+                  <c:v>0.3</c:v>
+                </c:pt>
+                <c:pt idx="29">
+                  <c:v>0.35</c:v>
+                </c:pt>
+                <c:pt idx="30">
+                  <c:v>0.3</c:v>
+                </c:pt>
+                <c:pt idx="31">
+                  <c:v>0.3</c:v>
+                </c:pt>
+                <c:pt idx="32">
+                  <c:v>0.3</c:v>
+                </c:pt>
+                <c:pt idx="33">
+                  <c:v>0.3</c:v>
+                </c:pt>
+                <c:pt idx="34">
+                  <c:v>0.3</c:v>
+                </c:pt>
+                <c:pt idx="35">
+                  <c:v>0.3</c:v>
+                </c:pt>
+                <c:pt idx="36">
+                  <c:v>0.3</c:v>
+                </c:pt>
+                <c:pt idx="37">
+                  <c:v>0.3</c:v>
+                </c:pt>
+                <c:pt idx="38">
+                  <c:v>0.25</c:v>
+                </c:pt>
+                <c:pt idx="39">
                   <c:v>0.2</c:v>
                 </c:pt>
-                <c:pt idx="18">
+                <c:pt idx="40">
                   <c:v>0.2</c:v>
                 </c:pt>
-                <c:pt idx="19">
+                <c:pt idx="41">
                   <c:v>0.2</c:v>
                 </c:pt>
-                <c:pt idx="20">
+                <c:pt idx="42">
+                  <c:v>0.25</c:v>
+                </c:pt>
+                <c:pt idx="43">
+                  <c:v>0.25</c:v>
+                </c:pt>
+                <c:pt idx="44">
                   <c:v>0.2</c:v>
                 </c:pt>
-                <c:pt idx="21">
+                <c:pt idx="45">
                   <c:v>0.2</c:v>
+                </c:pt>
+                <c:pt idx="46">
+                  <c:v>0.2</c:v>
+                </c:pt>
+                <c:pt idx="47">
+                  <c:v>0.2</c:v>
+                </c:pt>
+                <c:pt idx="48">
+                  <c:v>0.2</c:v>
+                </c:pt>
+                <c:pt idx="49">
+                  <c:v>0.2</c:v>
+                </c:pt>
+                <c:pt idx="50">
+                  <c:v>0.2</c:v>
+                </c:pt>
+                <c:pt idx="51">
+                  <c:v>0.2</c:v>
+                </c:pt>
+                <c:pt idx="52">
+                  <c:v>0.2</c:v>
+                </c:pt>
+                <c:pt idx="53">
+                  <c:v>0.2</c:v>
+                </c:pt>
+                <c:pt idx="54">
+                  <c:v>0.2</c:v>
+                </c:pt>
+                <c:pt idx="55">
+                  <c:v>0.2</c:v>
+                </c:pt>
+                <c:pt idx="56">
+                  <c:v>0.2</c:v>
+                </c:pt>
+                <c:pt idx="57">
+                  <c:v>0.15</c:v>
+                </c:pt>
+                <c:pt idx="58">
+                  <c:v>0.15</c:v>
+                </c:pt>
+                <c:pt idx="59">
+                  <c:v>0.15</c:v>
+                </c:pt>
+                <c:pt idx="60">
+                  <c:v>0.15</c:v>
+                </c:pt>
+                <c:pt idx="61">
+                  <c:v>0.15</c:v>
+                </c:pt>
+                <c:pt idx="62">
+                  <c:v>0.15</c:v>
+                </c:pt>
+                <c:pt idx="63">
+                  <c:v>0.15</c:v>
+                </c:pt>
+                <c:pt idx="64">
+                  <c:v>0.15</c:v>
+                </c:pt>
+                <c:pt idx="65">
+                  <c:v>0.15</c:v>
+                </c:pt>
+                <c:pt idx="66">
+                  <c:v>0.15</c:v>
+                </c:pt>
+                <c:pt idx="67">
+                  <c:v>0.15</c:v>
+                </c:pt>
+                <c:pt idx="68">
+                  <c:v>0.15</c:v>
+                </c:pt>
+                <c:pt idx="69">
+                  <c:v>0.15</c:v>
+                </c:pt>
+                <c:pt idx="70">
+                  <c:v>0.15</c:v>
+                </c:pt>
+                <c:pt idx="71">
+                  <c:v>0.1</c:v>
+                </c:pt>
+                <c:pt idx="72">
+                  <c:v>0.1</c:v>
+                </c:pt>
+                <c:pt idx="73">
+                  <c:v>0.1</c:v>
+                </c:pt>
+                <c:pt idx="74">
+                  <c:v>0.1</c:v>
+                </c:pt>
+                <c:pt idx="75">
+                  <c:v>0.1</c:v>
+                </c:pt>
+                <c:pt idx="76">
+                  <c:v>0.1</c:v>
+                </c:pt>
+                <c:pt idx="77">
+                  <c:v>0.1</c:v>
+                </c:pt>
+                <c:pt idx="78">
+                  <c:v>0.1</c:v>
+                </c:pt>
+                <c:pt idx="79">
+                  <c:v>0.1</c:v>
+                </c:pt>
+                <c:pt idx="80">
+                  <c:v>0.1</c:v>
+                </c:pt>
+                <c:pt idx="81">
+                  <c:v>0.1</c:v>
+                </c:pt>
+                <c:pt idx="82">
+                  <c:v>0.1</c:v>
+                </c:pt>
+                <c:pt idx="83">
+                  <c:v>0.1</c:v>
+                </c:pt>
+                <c:pt idx="84">
+                  <c:v>0.05</c:v>
+                </c:pt>
+                <c:pt idx="85">
+                  <c:v>0.05</c:v>
+                </c:pt>
+                <c:pt idx="86">
+                  <c:v>0.05</c:v>
+                </c:pt>
+                <c:pt idx="87">
+                  <c:v>0.05</c:v>
+                </c:pt>
+                <c:pt idx="88">
+                  <c:v>0.05</c:v>
                 </c:pt>
               </c:numCache>
             </c:numRef>
@@ -771,11 +1189,11 @@
           <c:showBubbleSize val="0"/>
         </c:dLbls>
         <c:smooth val="0"/>
-        <c:axId val="485377784"/>
-        <c:axId val="485378568"/>
+        <c:axId val="407762096"/>
+        <c:axId val="344182728"/>
       </c:lineChart>
       <c:catAx>
-        <c:axId val="485377784"/>
+        <c:axId val="407762096"/>
         <c:scaling>
           <c:orientation val="minMax"/>
         </c:scaling>
@@ -818,7 +1236,7 @@
             <a:endParaRPr lang="en-US"/>
           </a:p>
         </c:txPr>
-        <c:crossAx val="485378568"/>
+        <c:crossAx val="344182728"/>
         <c:crosses val="autoZero"/>
         <c:auto val="1"/>
         <c:lblAlgn val="ctr"/>
@@ -826,7 +1244,7 @@
         <c:noMultiLvlLbl val="0"/>
       </c:catAx>
       <c:valAx>
-        <c:axId val="485378568"/>
+        <c:axId val="344182728"/>
         <c:scaling>
           <c:orientation val="minMax"/>
         </c:scaling>
@@ -877,7 +1295,7 @@
             <a:endParaRPr lang="en-US"/>
           </a:p>
         </c:txPr>
-        <c:crossAx val="485377784"/>
+        <c:crossAx val="407762096"/>
         <c:crosses val="autoZero"/>
         <c:crossBetween val="between"/>
       </c:valAx>
@@ -2302,7 +2720,7 @@
           <a:p>
             <a:fld id="{03953C3F-D36F-4B1A-A959-B36391D1B06D}" type="datetimeFigureOut">
               <a:rPr lang="en-US" smtClean="0"/>
-              <a:t>3/1/2016</a:t>
+              <a:t>3/2/2016</a:t>
             </a:fld>
             <a:endParaRPr lang="en-US" dirty="0"/>
           </a:p>
@@ -2716,7 +3134,7 @@
           <a:p>
             <a:fld id="{03953C3F-D36F-4B1A-A959-B36391D1B06D}" type="datetimeFigureOut">
               <a:rPr lang="en-US" smtClean="0"/>
-              <a:t>3/1/2016</a:t>
+              <a:t>3/2/2016</a:t>
             </a:fld>
             <a:endParaRPr lang="en-US" dirty="0"/>
           </a:p>
@@ -3052,7 +3470,7 @@
           <a:p>
             <a:fld id="{03953C3F-D36F-4B1A-A959-B36391D1B06D}" type="datetimeFigureOut">
               <a:rPr lang="en-US" smtClean="0"/>
-              <a:t>3/1/2016</a:t>
+              <a:t>3/2/2016</a:t>
             </a:fld>
             <a:endParaRPr lang="en-US" dirty="0"/>
           </a:p>
@@ -3457,7 +3875,7 @@
           <a:p>
             <a:fld id="{03953C3F-D36F-4B1A-A959-B36391D1B06D}" type="datetimeFigureOut">
               <a:rPr lang="en-US" smtClean="0"/>
-              <a:t>3/1/2016</a:t>
+              <a:t>3/2/2016</a:t>
             </a:fld>
             <a:endParaRPr lang="en-US" dirty="0"/>
           </a:p>
@@ -4025,7 +4443,7 @@
           <a:p>
             <a:fld id="{03953C3F-D36F-4B1A-A959-B36391D1B06D}" type="datetimeFigureOut">
               <a:rPr lang="en-US" smtClean="0"/>
-              <a:t>3/1/2016</a:t>
+              <a:t>3/2/2016</a:t>
             </a:fld>
             <a:endParaRPr lang="en-US" dirty="0"/>
           </a:p>
@@ -4706,7 +5124,7 @@
           <a:p>
             <a:fld id="{03953C3F-D36F-4B1A-A959-B36391D1B06D}" type="datetimeFigureOut">
               <a:rPr lang="en-US" smtClean="0"/>
-              <a:t>3/1/2016</a:t>
+              <a:t>3/2/2016</a:t>
             </a:fld>
             <a:endParaRPr lang="en-US" dirty="0"/>
           </a:p>
@@ -5619,7 +6037,7 @@
           <a:p>
             <a:fld id="{03953C3F-D36F-4B1A-A959-B36391D1B06D}" type="datetimeFigureOut">
               <a:rPr lang="en-US" smtClean="0"/>
-              <a:t>3/1/2016</a:t>
+              <a:t>3/2/2016</a:t>
             </a:fld>
             <a:endParaRPr lang="en-US" dirty="0"/>
           </a:p>
@@ -5932,7 +6350,7 @@
           <a:p>
             <a:fld id="{03953C3F-D36F-4B1A-A959-B36391D1B06D}" type="datetimeFigureOut">
               <a:rPr lang="en-US" smtClean="0"/>
-              <a:t>3/1/2016</a:t>
+              <a:t>3/2/2016</a:t>
             </a:fld>
             <a:endParaRPr lang="en-US" dirty="0"/>
           </a:p>
@@ -6196,7 +6614,7 @@
           <a:p>
             <a:fld id="{03953C3F-D36F-4B1A-A959-B36391D1B06D}" type="datetimeFigureOut">
               <a:rPr lang="en-US" smtClean="0"/>
-              <a:t>3/1/2016</a:t>
+              <a:t>3/2/2016</a:t>
             </a:fld>
             <a:endParaRPr lang="en-US" dirty="0"/>
           </a:p>
@@ -6519,7 +6937,7 @@
           <a:p>
             <a:fld id="{03953C3F-D36F-4B1A-A959-B36391D1B06D}" type="datetimeFigureOut">
               <a:rPr lang="en-US" smtClean="0"/>
-              <a:t>3/1/2016</a:t>
+              <a:t>3/2/2016</a:t>
             </a:fld>
             <a:endParaRPr lang="en-US" dirty="0"/>
           </a:p>
@@ -6908,7 +7326,7 @@
           <a:p>
             <a:fld id="{03953C3F-D36F-4B1A-A959-B36391D1B06D}" type="datetimeFigureOut">
               <a:rPr lang="en-US" smtClean="0"/>
-              <a:t>3/1/2016</a:t>
+              <a:t>3/2/2016</a:t>
             </a:fld>
             <a:endParaRPr lang="en-US" dirty="0"/>
           </a:p>
@@ -7284,7 +7702,7 @@
           <a:p>
             <a:fld id="{03953C3F-D36F-4B1A-A959-B36391D1B06D}" type="datetimeFigureOut">
               <a:rPr lang="en-US" smtClean="0"/>
-              <a:t>3/1/2016</a:t>
+              <a:t>3/2/2016</a:t>
             </a:fld>
             <a:endParaRPr lang="en-US" dirty="0"/>
           </a:p>
@@ -7790,7 +8208,7 @@
           <a:p>
             <a:fld id="{03953C3F-D36F-4B1A-A959-B36391D1B06D}" type="datetimeFigureOut">
               <a:rPr lang="en-US" smtClean="0"/>
-              <a:t>3/1/2016</a:t>
+              <a:t>3/2/2016</a:t>
             </a:fld>
             <a:endParaRPr lang="en-US" dirty="0"/>
           </a:p>
@@ -8047,7 +8465,7 @@
           <a:p>
             <a:fld id="{03953C3F-D36F-4B1A-A959-B36391D1B06D}" type="datetimeFigureOut">
               <a:rPr lang="en-US" smtClean="0"/>
-              <a:t>3/1/2016</a:t>
+              <a:t>3/2/2016</a:t>
             </a:fld>
             <a:endParaRPr lang="en-US" dirty="0"/>
           </a:p>
@@ -8210,7 +8628,7 @@
           <a:p>
             <a:fld id="{03953C3F-D36F-4B1A-A959-B36391D1B06D}" type="datetimeFigureOut">
               <a:rPr lang="en-US" smtClean="0"/>
-              <a:t>3/1/2016</a:t>
+              <a:t>3/2/2016</a:t>
             </a:fld>
             <a:endParaRPr lang="en-US" dirty="0"/>
           </a:p>
@@ -8600,7 +9018,7 @@
           <a:p>
             <a:fld id="{03953C3F-D36F-4B1A-A959-B36391D1B06D}" type="datetimeFigureOut">
               <a:rPr lang="en-US" smtClean="0"/>
-              <a:t>3/1/2016</a:t>
+              <a:t>3/2/2016</a:t>
             </a:fld>
             <a:endParaRPr lang="en-US" dirty="0"/>
           </a:p>
@@ -9009,7 +9427,7 @@
           <a:p>
             <a:fld id="{03953C3F-D36F-4B1A-A959-B36391D1B06D}" type="datetimeFigureOut">
               <a:rPr lang="en-US" smtClean="0"/>
-              <a:t>3/1/2016</a:t>
+              <a:t>3/2/2016</a:t>
             </a:fld>
             <a:endParaRPr lang="en-US" dirty="0"/>
           </a:p>
@@ -9253,7 +9671,7 @@
           <a:p>
             <a:fld id="{03953C3F-D36F-4B1A-A959-B36391D1B06D}" type="datetimeFigureOut">
               <a:rPr lang="en-US" smtClean="0"/>
-              <a:t>3/1/2016</a:t>
+              <a:t>3/2/2016</a:t>
             </a:fld>
             <a:endParaRPr lang="en-US" dirty="0"/>
           </a:p>
@@ -9809,11 +10227,7 @@
             </a:pPr>
             <a:r>
               <a:rPr lang="en-US" sz="2400" dirty="0"/>
-              <a:t>100</a:t>
-            </a:r>
-            <a:r>
-              <a:rPr lang="en-US" sz="2400" dirty="0"/>
-              <a:t>% classified correctly</a:t>
+              <a:t>100% classified correctly</a:t>
             </a:r>
           </a:p>
           <a:p>
@@ -9909,21 +10323,21 @@
       </p:sp>
       <p:graphicFrame>
         <p:nvGraphicFramePr>
-          <p:cNvPr id="6" name="Chart 5"/>
+          <p:cNvPr id="4" name="Chart 3"/>
           <p:cNvGraphicFramePr>
             <a:graphicFrameLocks/>
           </p:cNvGraphicFramePr>
           <p:nvPr>
             <p:extLst>
               <p:ext uri="{D42A27DB-BD31-4B8C-83A1-F6EECF244321}">
-                <p14:modId xmlns:p14="http://schemas.microsoft.com/office/powerpoint/2010/main" val="601575038"/>
+                <p14:modId xmlns:p14="http://schemas.microsoft.com/office/powerpoint/2010/main" val="1124569852"/>
               </p:ext>
             </p:extLst>
           </p:nvPr>
         </p:nvGraphicFramePr>
         <p:xfrm>
-          <a:off x="915251" y="1962150"/>
-          <a:ext cx="10181374" cy="4781550"/>
+          <a:off x="493058" y="1940858"/>
+          <a:ext cx="9977717" cy="4917141"/>
         </p:xfrm>
         <a:graphic>
           <a:graphicData uri="http://schemas.openxmlformats.org/drawingml/2006/chart">
@@ -9951,6 +10365,59 @@
 </p:sld>
 </file>
 
+<file path=ppt/slides/slide12.xml><?xml version="1.0" encoding="utf-8"?>
+<p:sld xmlns:a="http://schemas.openxmlformats.org/drawingml/2006/main" xmlns:r="http://schemas.openxmlformats.org/officeDocument/2006/relationships" xmlns:p="http://schemas.openxmlformats.org/presentationml/2006/main">
+  <p:cSld>
+    <p:spTree>
+      <p:nvGrpSpPr>
+        <p:cNvPr id="1" name=""/>
+        <p:cNvGrpSpPr/>
+        <p:nvPr/>
+      </p:nvGrpSpPr>
+      <p:grpSpPr>
+        <a:xfrm>
+          <a:off x="0" y="0"/>
+          <a:ext cx="0" cy="0"/>
+          <a:chOff x="0" y="0"/>
+          <a:chExt cx="0" cy="0"/>
+        </a:xfrm>
+      </p:grpSpPr>
+      <p:sp>
+        <p:nvSpPr>
+          <p:cNvPr id="2" name="Title 1"/>
+          <p:cNvSpPr>
+            <a:spLocks noGrp="1"/>
+          </p:cNvSpPr>
+          <p:nvPr>
+            <p:ph type="title"/>
+          </p:nvPr>
+        </p:nvSpPr>
+        <p:spPr/>
+        <p:txBody>
+          <a:bodyPr/>
+          <a:lstStyle/>
+          <a:p>
+            <a:r>
+              <a:rPr lang="en-US" dirty="0" smtClean="0"/>
+              <a:t>Demo</a:t>
+            </a:r>
+            <a:endParaRPr lang="en-US" dirty="0"/>
+          </a:p>
+        </p:txBody>
+      </p:sp>
+    </p:spTree>
+    <p:extLst>
+      <p:ext uri="{BB962C8B-B14F-4D97-AF65-F5344CB8AC3E}">
+        <p14:creationId xmlns:p14="http://schemas.microsoft.com/office/powerpoint/2010/main" val="1106094050"/>
+      </p:ext>
+    </p:extLst>
+  </p:cSld>
+  <p:clrMapOvr>
+    <a:masterClrMapping/>
+  </p:clrMapOvr>
+</p:sld>
+</file>
+
 <file path=ppt/slides/slide2.xml><?xml version="1.0" encoding="utf-8"?>
 <p:sld xmlns:a="http://schemas.openxmlformats.org/drawingml/2006/main" xmlns:r="http://schemas.openxmlformats.org/officeDocument/2006/relationships" xmlns:p="http://schemas.openxmlformats.org/presentationml/2006/main">
   <p:cSld>
@@ -10018,13 +10485,8 @@
             <a:pPr lvl="1"/>
             <a:r>
               <a:rPr lang="en-US" dirty="0" smtClean="0"/>
-              <a:t>Training and Classification on based on variable K, where K is identified by the number of nearest </a:t>
-            </a:r>
-            <a:r>
-              <a:rPr lang="en-US" dirty="0" smtClean="0"/>
-              <a:t>neighbors (points).</a:t>
-            </a:r>
-            <a:endParaRPr lang="en-US" dirty="0" smtClean="0"/>
+              <a:t>Training and Classification on based on variable K, where K is identified by the number of nearest neighbors (points).</a:t>
+            </a:r>
           </a:p>
           <a:p>
             <a:pPr marL="0" indent="0">
@@ -10039,21 +10501,8 @@
             <a:pPr lvl="1"/>
             <a:r>
               <a:rPr lang="en-US" dirty="0" smtClean="0"/>
-              <a:t>Average </a:t>
-            </a:r>
-            <a:r>
-              <a:rPr lang="en-US" dirty="0" smtClean="0"/>
-              <a:t>of all points in </a:t>
-            </a:r>
-            <a:r>
-              <a:rPr lang="en-US" dirty="0" smtClean="0"/>
-              <a:t>a </a:t>
-            </a:r>
-            <a:r>
-              <a:rPr lang="en-US" dirty="0" smtClean="0"/>
-              <a:t>classification.</a:t>
-            </a:r>
-            <a:endParaRPr lang="en-US" dirty="0" smtClean="0"/>
+              <a:t>Average of all points in a classification.</a:t>
+            </a:r>
           </a:p>
           <a:p>
             <a:pPr marL="0" indent="0">
@@ -10335,11 +10784,7 @@
           <a:p>
             <a:r>
               <a:rPr lang="en-US" dirty="0" smtClean="0"/>
-              <a:t>Results – K-nearest </a:t>
-            </a:r>
-            <a:r>
-              <a:rPr lang="en-US" dirty="0" smtClean="0"/>
-              <a:t>Neighbors (k=3)</a:t>
+              <a:t>Results – K-nearest Neighbors (k=3)</a:t>
             </a:r>
             <a:endParaRPr lang="en-US" dirty="0"/>
           </a:p>
@@ -10784,7 +11229,6 @@
               <a:rPr lang="en-US" dirty="0" smtClean="0"/>
               <a:t>20 images to classify</a:t>
             </a:r>
-            <a:endParaRPr lang="en-US" dirty="0" smtClean="0"/>
           </a:p>
         </p:txBody>
       </p:sp>

</xml_diff>